<commit_message>
renamed package to from lsatTS to LandsatTS and updated files
</commit_message>
<xml_diff>
--- a/man/manuscript/figures/figure_1_schematic.pptx
+++ b/man/manuscript/figures/figure_1_schematic.pptx
@@ -243,7 +243,7 @@
           <a:p>
             <a:fld id="{DD1C356E-5614-449E-8F90-F310717C40C4}" type="datetimeFigureOut">
               <a:rPr lang="en-US" smtClean="0"/>
-              <a:t>3/3/2022</a:t>
+              <a:t>7/27/2022</a:t>
             </a:fld>
             <a:endParaRPr lang="en-US"/>
           </a:p>
@@ -413,7 +413,7 @@
           <a:p>
             <a:fld id="{DD1C356E-5614-449E-8F90-F310717C40C4}" type="datetimeFigureOut">
               <a:rPr lang="en-US" smtClean="0"/>
-              <a:t>3/3/2022</a:t>
+              <a:t>7/27/2022</a:t>
             </a:fld>
             <a:endParaRPr lang="en-US"/>
           </a:p>
@@ -593,7 +593,7 @@
           <a:p>
             <a:fld id="{DD1C356E-5614-449E-8F90-F310717C40C4}" type="datetimeFigureOut">
               <a:rPr lang="en-US" smtClean="0"/>
-              <a:t>3/3/2022</a:t>
+              <a:t>7/27/2022</a:t>
             </a:fld>
             <a:endParaRPr lang="en-US"/>
           </a:p>
@@ -763,7 +763,7 @@
           <a:p>
             <a:fld id="{DD1C356E-5614-449E-8F90-F310717C40C4}" type="datetimeFigureOut">
               <a:rPr lang="en-US" smtClean="0"/>
-              <a:t>3/3/2022</a:t>
+              <a:t>7/27/2022</a:t>
             </a:fld>
             <a:endParaRPr lang="en-US"/>
           </a:p>
@@ -1007,7 +1007,7 @@
           <a:p>
             <a:fld id="{DD1C356E-5614-449E-8F90-F310717C40C4}" type="datetimeFigureOut">
               <a:rPr lang="en-US" smtClean="0"/>
-              <a:t>3/3/2022</a:t>
+              <a:t>7/27/2022</a:t>
             </a:fld>
             <a:endParaRPr lang="en-US"/>
           </a:p>
@@ -1239,7 +1239,7 @@
           <a:p>
             <a:fld id="{DD1C356E-5614-449E-8F90-F310717C40C4}" type="datetimeFigureOut">
               <a:rPr lang="en-US" smtClean="0"/>
-              <a:t>3/3/2022</a:t>
+              <a:t>7/27/2022</a:t>
             </a:fld>
             <a:endParaRPr lang="en-US"/>
           </a:p>
@@ -1606,7 +1606,7 @@
           <a:p>
             <a:fld id="{DD1C356E-5614-449E-8F90-F310717C40C4}" type="datetimeFigureOut">
               <a:rPr lang="en-US" smtClean="0"/>
-              <a:t>3/3/2022</a:t>
+              <a:t>7/27/2022</a:t>
             </a:fld>
             <a:endParaRPr lang="en-US"/>
           </a:p>
@@ -1724,7 +1724,7 @@
           <a:p>
             <a:fld id="{DD1C356E-5614-449E-8F90-F310717C40C4}" type="datetimeFigureOut">
               <a:rPr lang="en-US" smtClean="0"/>
-              <a:t>3/3/2022</a:t>
+              <a:t>7/27/2022</a:t>
             </a:fld>
             <a:endParaRPr lang="en-US"/>
           </a:p>
@@ -1819,7 +1819,7 @@
           <a:p>
             <a:fld id="{DD1C356E-5614-449E-8F90-F310717C40C4}" type="datetimeFigureOut">
               <a:rPr lang="en-US" smtClean="0"/>
-              <a:t>3/3/2022</a:t>
+              <a:t>7/27/2022</a:t>
             </a:fld>
             <a:endParaRPr lang="en-US"/>
           </a:p>
@@ -2096,7 +2096,7 @@
           <a:p>
             <a:fld id="{DD1C356E-5614-449E-8F90-F310717C40C4}" type="datetimeFigureOut">
               <a:rPr lang="en-US" smtClean="0"/>
-              <a:t>3/3/2022</a:t>
+              <a:t>7/27/2022</a:t>
             </a:fld>
             <a:endParaRPr lang="en-US"/>
           </a:p>
@@ -2353,7 +2353,7 @@
           <a:p>
             <a:fld id="{DD1C356E-5614-449E-8F90-F310717C40C4}" type="datetimeFigureOut">
               <a:rPr lang="en-US" smtClean="0"/>
-              <a:t>3/3/2022</a:t>
+              <a:t>7/27/2022</a:t>
             </a:fld>
             <a:endParaRPr lang="en-US"/>
           </a:p>
@@ -2566,7 +2566,7 @@
           <a:p>
             <a:fld id="{DD1C356E-5614-449E-8F90-F310717C40C4}" type="datetimeFigureOut">
               <a:rPr lang="en-US" smtClean="0"/>
-              <a:t>3/3/2022</a:t>
+              <a:t>7/27/2022</a:t>
             </a:fld>
             <a:endParaRPr lang="en-US"/>
           </a:p>
@@ -4068,14 +4068,14 @@
           <a:p>
             <a:pPr algn="ctr"/>
             <a:r>
-              <a:rPr lang="en-US" sz="1200" i="1" dirty="0" err="1">
+              <a:rPr lang="en-US" sz="1200" dirty="0" err="1">
                 <a:solidFill>
                   <a:schemeClr val="tx1"/>
                 </a:solidFill>
               </a:rPr>
               <a:t>lsat_fit_phenological_curves</a:t>
             </a:r>
-            <a:endParaRPr lang="en-US" sz="1200" i="1" dirty="0">
+            <a:endParaRPr lang="en-US" sz="1200" dirty="0">
               <a:solidFill>
                 <a:schemeClr val="tx1"/>
               </a:solidFill>
@@ -4136,14 +4136,14 @@
           <a:p>
             <a:pPr algn="ctr"/>
             <a:r>
-              <a:rPr lang="en-US" sz="1200" i="1" dirty="0" err="1">
+              <a:rPr lang="en-US" sz="1200" dirty="0" err="1">
                 <a:solidFill>
                   <a:schemeClr val="tx1"/>
                 </a:solidFill>
               </a:rPr>
               <a:t>lsat_summarize_growing_season</a:t>
             </a:r>
-            <a:endParaRPr lang="en-US" sz="1200" i="1" dirty="0">
+            <a:endParaRPr lang="en-US" sz="1200" dirty="0">
               <a:solidFill>
                 <a:schemeClr val="tx1"/>
               </a:solidFill>
@@ -4204,14 +4204,14 @@
           <a:p>
             <a:pPr algn="ctr"/>
             <a:r>
-              <a:rPr lang="en-US" sz="1200" i="1" dirty="0" err="1">
+              <a:rPr lang="en-US" sz="1200" dirty="0" err="1">
                 <a:solidFill>
                   <a:schemeClr val="tx1"/>
                 </a:solidFill>
               </a:rPr>
               <a:t>lsat_evaluate_phenological_max</a:t>
             </a:r>
-            <a:endParaRPr lang="en-US" sz="1200" i="1" dirty="0">
+            <a:endParaRPr lang="en-US" sz="1200" dirty="0">
               <a:solidFill>
                 <a:schemeClr val="tx1"/>
               </a:solidFill>
@@ -4272,14 +4272,14 @@
           <a:p>
             <a:pPr algn="ctr"/>
             <a:r>
-              <a:rPr lang="en-US" sz="1200" i="1" dirty="0" err="1">
+              <a:rPr lang="en-US" sz="1200" dirty="0" err="1">
                 <a:solidFill>
                   <a:schemeClr val="tx1"/>
                 </a:solidFill>
               </a:rPr>
               <a:t>lsat_calc_trend</a:t>
             </a:r>
-            <a:endParaRPr lang="en-US" sz="1200" i="1" dirty="0">
+            <a:endParaRPr lang="en-US" sz="1200" dirty="0">
               <a:solidFill>
                 <a:schemeClr val="tx1"/>
               </a:solidFill>

</xml_diff>